<commit_message>
wrote hardcoded SQL commands
</commit_message>
<xml_diff>
--- a/ERDIMS.pptx
+++ b/ERDIMS.pptx
@@ -262,7 +262,7 @@
           <a:p>
             <a:fld id="{5051FD8D-56BE-41D6-A4FE-62A6C410B842}" type="datetimeFigureOut">
               <a:rPr lang="en-GB" smtClean="0"/>
-              <a:t>01/07/2020</a:t>
+              <a:t>04/07/2020</a:t>
             </a:fld>
             <a:endParaRPr lang="en-GB"/>
           </a:p>
@@ -462,7 +462,7 @@
           <a:p>
             <a:fld id="{5051FD8D-56BE-41D6-A4FE-62A6C410B842}" type="datetimeFigureOut">
               <a:rPr lang="en-GB" smtClean="0"/>
-              <a:t>01/07/2020</a:t>
+              <a:t>04/07/2020</a:t>
             </a:fld>
             <a:endParaRPr lang="en-GB"/>
           </a:p>
@@ -672,7 +672,7 @@
           <a:p>
             <a:fld id="{5051FD8D-56BE-41D6-A4FE-62A6C410B842}" type="datetimeFigureOut">
               <a:rPr lang="en-GB" smtClean="0"/>
-              <a:t>01/07/2020</a:t>
+              <a:t>04/07/2020</a:t>
             </a:fld>
             <a:endParaRPr lang="en-GB"/>
           </a:p>
@@ -872,7 +872,7 @@
           <a:p>
             <a:fld id="{5051FD8D-56BE-41D6-A4FE-62A6C410B842}" type="datetimeFigureOut">
               <a:rPr lang="en-GB" smtClean="0"/>
-              <a:t>01/07/2020</a:t>
+              <a:t>04/07/2020</a:t>
             </a:fld>
             <a:endParaRPr lang="en-GB"/>
           </a:p>
@@ -1148,7 +1148,7 @@
           <a:p>
             <a:fld id="{5051FD8D-56BE-41D6-A4FE-62A6C410B842}" type="datetimeFigureOut">
               <a:rPr lang="en-GB" smtClean="0"/>
-              <a:t>01/07/2020</a:t>
+              <a:t>04/07/2020</a:t>
             </a:fld>
             <a:endParaRPr lang="en-GB"/>
           </a:p>
@@ -1416,7 +1416,7 @@
           <a:p>
             <a:fld id="{5051FD8D-56BE-41D6-A4FE-62A6C410B842}" type="datetimeFigureOut">
               <a:rPr lang="en-GB" smtClean="0"/>
-              <a:t>01/07/2020</a:t>
+              <a:t>04/07/2020</a:t>
             </a:fld>
             <a:endParaRPr lang="en-GB"/>
           </a:p>
@@ -1831,7 +1831,7 @@
           <a:p>
             <a:fld id="{5051FD8D-56BE-41D6-A4FE-62A6C410B842}" type="datetimeFigureOut">
               <a:rPr lang="en-GB" smtClean="0"/>
-              <a:t>01/07/2020</a:t>
+              <a:t>04/07/2020</a:t>
             </a:fld>
             <a:endParaRPr lang="en-GB"/>
           </a:p>
@@ -1973,7 +1973,7 @@
           <a:p>
             <a:fld id="{5051FD8D-56BE-41D6-A4FE-62A6C410B842}" type="datetimeFigureOut">
               <a:rPr lang="en-GB" smtClean="0"/>
-              <a:t>01/07/2020</a:t>
+              <a:t>04/07/2020</a:t>
             </a:fld>
             <a:endParaRPr lang="en-GB"/>
           </a:p>
@@ -2086,7 +2086,7 @@
           <a:p>
             <a:fld id="{5051FD8D-56BE-41D6-A4FE-62A6C410B842}" type="datetimeFigureOut">
               <a:rPr lang="en-GB" smtClean="0"/>
-              <a:t>01/07/2020</a:t>
+              <a:t>04/07/2020</a:t>
             </a:fld>
             <a:endParaRPr lang="en-GB"/>
           </a:p>
@@ -2399,7 +2399,7 @@
           <a:p>
             <a:fld id="{5051FD8D-56BE-41D6-A4FE-62A6C410B842}" type="datetimeFigureOut">
               <a:rPr lang="en-GB" smtClean="0"/>
-              <a:t>01/07/2020</a:t>
+              <a:t>04/07/2020</a:t>
             </a:fld>
             <a:endParaRPr lang="en-GB"/>
           </a:p>
@@ -2688,7 +2688,7 @@
           <a:p>
             <a:fld id="{5051FD8D-56BE-41D6-A4FE-62A6C410B842}" type="datetimeFigureOut">
               <a:rPr lang="en-GB" smtClean="0"/>
-              <a:t>01/07/2020</a:t>
+              <a:t>04/07/2020</a:t>
             </a:fld>
             <a:endParaRPr lang="en-GB"/>
           </a:p>
@@ -2931,7 +2931,7 @@
           <a:p>
             <a:fld id="{5051FD8D-56BE-41D6-A4FE-62A6C410B842}" type="datetimeFigureOut">
               <a:rPr lang="en-GB" smtClean="0"/>
-              <a:t>01/07/2020</a:t>
+              <a:t>04/07/2020</a:t>
             </a:fld>
             <a:endParaRPr lang="en-GB"/>
           </a:p>
@@ -3443,7 +3443,7 @@
           <p:nvPr>
             <p:extLst>
               <p:ext uri="{D42A27DB-BD31-4B8C-83A1-F6EECF244321}">
-                <p14:modId xmlns:p14="http://schemas.microsoft.com/office/powerpoint/2010/main" val="3149308587"/>
+                <p14:modId xmlns:p14="http://schemas.microsoft.com/office/powerpoint/2010/main" val="3571853248"/>
               </p:ext>
             </p:extLst>
           </p:nvPr>
@@ -3749,6 +3749,10 @@
                     <a:bodyPr/>
                     <a:lstStyle/>
                     <a:p>
+                      <a:r>
+                        <a:rPr lang="en-US" sz="1400" dirty="0"/>
+                        <a:t>Int</a:t>
+                      </a:r>
                       <a:endParaRPr lang="en-GB" sz="1400" dirty="0"/>
                     </a:p>
                   </a:txBody>
@@ -3854,6 +3858,10 @@
                     <a:bodyPr/>
                     <a:lstStyle/>
                     <a:p>
+                      <a:r>
+                        <a:rPr lang="en-US" sz="1400" dirty="0"/>
+                        <a:t>Varchar(40)</a:t>
+                      </a:r>
                       <a:endParaRPr lang="en-GB" sz="1400" dirty="0"/>
                     </a:p>
                   </a:txBody>
@@ -3959,6 +3967,27 @@
                     <a:bodyPr/>
                     <a:lstStyle/>
                     <a:p>
+                      <a:pPr marL="0" marR="0" lvl="0" indent="0" algn="l" defTabSz="914400" rtl="0" eaLnBrk="1" fontAlgn="auto" latinLnBrk="0" hangingPunct="1">
+                        <a:lnSpc>
+                          <a:spcPct val="100000"/>
+                        </a:lnSpc>
+                        <a:spcBef>
+                          <a:spcPts val="0"/>
+                        </a:spcBef>
+                        <a:spcAft>
+                          <a:spcPts val="0"/>
+                        </a:spcAft>
+                        <a:buClrTx/>
+                        <a:buSzTx/>
+                        <a:buFontTx/>
+                        <a:buNone/>
+                        <a:tabLst/>
+                        <a:defRPr/>
+                      </a:pPr>
+                      <a:r>
+                        <a:rPr lang="en-US" sz="1400" dirty="0"/>
+                        <a:t>Varchar(40)</a:t>
+                      </a:r>
                       <a:endParaRPr lang="en-GB" sz="1400" dirty="0"/>
                     </a:p>
                   </a:txBody>
@@ -4064,6 +4093,27 @@
                     <a:bodyPr/>
                     <a:lstStyle/>
                     <a:p>
+                      <a:pPr marL="0" marR="0" lvl="0" indent="0" algn="l" defTabSz="914400" rtl="0" eaLnBrk="1" fontAlgn="auto" latinLnBrk="0" hangingPunct="1">
+                        <a:lnSpc>
+                          <a:spcPct val="100000"/>
+                        </a:lnSpc>
+                        <a:spcBef>
+                          <a:spcPts val="0"/>
+                        </a:spcBef>
+                        <a:spcAft>
+                          <a:spcPts val="0"/>
+                        </a:spcAft>
+                        <a:buClrTx/>
+                        <a:buSzTx/>
+                        <a:buFontTx/>
+                        <a:buNone/>
+                        <a:tabLst/>
+                        <a:defRPr/>
+                      </a:pPr>
+                      <a:r>
+                        <a:rPr lang="en-US" sz="1400" dirty="0"/>
+                        <a:t>Varchar(40)</a:t>
+                      </a:r>
                       <a:endParaRPr lang="en-GB" sz="1400" dirty="0"/>
                     </a:p>
                   </a:txBody>
@@ -4169,6 +4219,27 @@
                     <a:bodyPr/>
                     <a:lstStyle/>
                     <a:p>
+                      <a:pPr marL="0" marR="0" lvl="0" indent="0" algn="l" defTabSz="914400" rtl="0" eaLnBrk="1" fontAlgn="auto" latinLnBrk="0" hangingPunct="1">
+                        <a:lnSpc>
+                          <a:spcPct val="100000"/>
+                        </a:lnSpc>
+                        <a:spcBef>
+                          <a:spcPts val="0"/>
+                        </a:spcBef>
+                        <a:spcAft>
+                          <a:spcPts val="0"/>
+                        </a:spcAft>
+                        <a:buClrTx/>
+                        <a:buSzTx/>
+                        <a:buFontTx/>
+                        <a:buNone/>
+                        <a:tabLst/>
+                        <a:defRPr/>
+                      </a:pPr>
+                      <a:r>
+                        <a:rPr lang="en-US" sz="1400" dirty="0"/>
+                        <a:t>Varchar(40)</a:t>
+                      </a:r>
                       <a:endParaRPr lang="en-GB" sz="1400" dirty="0"/>
                     </a:p>
                   </a:txBody>
@@ -4236,14 +4307,14 @@
           <p:nvPr>
             <p:extLst>
               <p:ext uri="{D42A27DB-BD31-4B8C-83A1-F6EECF244321}">
-                <p14:modId xmlns:p14="http://schemas.microsoft.com/office/powerpoint/2010/main" val="2385467678"/>
+                <p14:modId xmlns:p14="http://schemas.microsoft.com/office/powerpoint/2010/main" val="851400847"/>
               </p:ext>
             </p:extLst>
           </p:nvPr>
         </p:nvGraphicFramePr>
         <p:xfrm>
           <a:off x="4930095" y="373437"/>
-          <a:ext cx="2748597" cy="1907178"/>
+          <a:ext cx="2748597" cy="1589315"/>
         </p:xfrm>
         <a:graphic>
           <a:graphicData uri="http://schemas.openxmlformats.org/drawingml/2006/table">
@@ -4357,6 +4428,10 @@
                     <a:bodyPr/>
                     <a:lstStyle/>
                     <a:p>
+                      <a:r>
+                        <a:rPr lang="en-US" sz="1400" dirty="0"/>
+                        <a:t>Int</a:t>
+                      </a:r>
                       <a:endParaRPr lang="en-GB" sz="1400" dirty="0"/>
                     </a:p>
                   </a:txBody>
@@ -4396,7 +4471,11 @@
                     <a:bodyPr/>
                     <a:lstStyle/>
                     <a:p>
-                      <a:endParaRPr lang="en-GB" sz="1400"/>
+                      <a:r>
+                        <a:rPr lang="en-US" sz="1400" dirty="0"/>
+                        <a:t>Int</a:t>
+                      </a:r>
+                      <a:endParaRPr lang="en-GB" sz="1400" dirty="0"/>
                     </a:p>
                   </a:txBody>
                   <a:tcPr/>
@@ -4427,6 +4506,10 @@
                     <a:bodyPr/>
                     <a:lstStyle/>
                     <a:p>
+                      <a:r>
+                        <a:rPr lang="en-US" sz="1400" dirty="0"/>
+                        <a:t>Dec(7,2)</a:t>
+                      </a:r>
                       <a:endParaRPr lang="en-GB" sz="1400" dirty="0"/>
                     </a:p>
                   </a:txBody>
@@ -4438,41 +4521,6 @@
                   </a:ext>
                 </a:extLst>
               </a:tr>
-              <a:tr h="317863">
-                <a:tc>
-                  <a:txBody>
-                    <a:bodyPr/>
-                    <a:lstStyle/>
-                    <a:p>
-                      <a:r>
-                        <a:rPr lang="en-US" sz="1400" dirty="0"/>
-                        <a:t>FK </a:t>
-                      </a:r>
-                      <a:r>
-                        <a:rPr lang="en-US" sz="1400" dirty="0" err="1"/>
-                        <a:t>address_ID</a:t>
-                      </a:r>
-                      <a:endParaRPr lang="en-GB" sz="1400" dirty="0"/>
-                    </a:p>
-                  </a:txBody>
-                  <a:tcPr/>
-                </a:tc>
-                <a:tc>
-                  <a:txBody>
-                    <a:bodyPr/>
-                    <a:lstStyle/>
-                    <a:p>
-                      <a:endParaRPr lang="en-GB" sz="1400" dirty="0"/>
-                    </a:p>
-                  </a:txBody>
-                  <a:tcPr/>
-                </a:tc>
-                <a:extLst>
-                  <a:ext uri="{0D108BD9-81ED-4DB2-BD59-A6C34878D82A}">
-                    <a16:rowId xmlns:a16="http://schemas.microsoft.com/office/drawing/2014/main" val="826152422"/>
-                  </a:ext>
-                </a:extLst>
-              </a:tr>
             </a:tbl>
           </a:graphicData>
         </a:graphic>
@@ -4492,7 +4540,7 @@
           <p:nvPr>
             <p:extLst>
               <p:ext uri="{D42A27DB-BD31-4B8C-83A1-F6EECF244321}">
-                <p14:modId xmlns:p14="http://schemas.microsoft.com/office/powerpoint/2010/main" val="4170758031"/>
+                <p14:modId xmlns:p14="http://schemas.microsoft.com/office/powerpoint/2010/main" val="2515779031"/>
               </p:ext>
             </p:extLst>
           </p:nvPr>
@@ -4630,6 +4678,10 @@
                     <a:bodyPr/>
                     <a:lstStyle/>
                     <a:p>
+                      <a:r>
+                        <a:rPr lang="en-US" sz="1400" dirty="0"/>
+                        <a:t>Int</a:t>
+                      </a:r>
                       <a:endParaRPr lang="en-GB" sz="1400" dirty="0"/>
                     </a:p>
                   </a:txBody>
@@ -4661,6 +4713,10 @@
                     <a:bodyPr/>
                     <a:lstStyle/>
                     <a:p>
+                      <a:r>
+                        <a:rPr lang="en-US" sz="1400" dirty="0"/>
+                        <a:t>Int</a:t>
+                      </a:r>
                       <a:endParaRPr lang="en-GB" sz="1400" dirty="0"/>
                     </a:p>
                   </a:txBody>
@@ -4692,6 +4748,10 @@
                     <a:bodyPr/>
                     <a:lstStyle/>
                     <a:p>
+                      <a:r>
+                        <a:rPr lang="en-US" sz="1400" dirty="0"/>
+                        <a:t>Dec(7,2)</a:t>
+                      </a:r>
                       <a:endParaRPr lang="en-GB" sz="1400" dirty="0"/>
                     </a:p>
                   </a:txBody>
@@ -4722,7 +4782,7 @@
           <p:nvPr>
             <p:extLst>
               <p:ext uri="{D42A27DB-BD31-4B8C-83A1-F6EECF244321}">
-                <p14:modId xmlns:p14="http://schemas.microsoft.com/office/powerpoint/2010/main" val="408024801"/>
+                <p14:modId xmlns:p14="http://schemas.microsoft.com/office/powerpoint/2010/main" val="3261657453"/>
               </p:ext>
             </p:extLst>
           </p:nvPr>
@@ -4843,6 +4903,10 @@
                     <a:bodyPr/>
                     <a:lstStyle/>
                     <a:p>
+                      <a:r>
+                        <a:rPr lang="en-US" sz="1400" dirty="0"/>
+                        <a:t>Int</a:t>
+                      </a:r>
                       <a:endParaRPr lang="en-GB" sz="1400" dirty="0"/>
                     </a:p>
                   </a:txBody>
@@ -4874,6 +4938,10 @@
                     <a:bodyPr/>
                     <a:lstStyle/>
                     <a:p>
+                      <a:r>
+                        <a:rPr lang="en-US" sz="1400" dirty="0"/>
+                        <a:t>Int</a:t>
+                      </a:r>
                       <a:endParaRPr lang="en-GB" sz="1400" dirty="0"/>
                     </a:p>
                   </a:txBody>
@@ -4922,6 +4990,10 @@
                     <a:bodyPr/>
                     <a:lstStyle/>
                     <a:p>
+                      <a:r>
+                        <a:rPr lang="en-US" sz="1400" dirty="0"/>
+                        <a:t>Dec(7,2)</a:t>
+                      </a:r>
                       <a:endParaRPr lang="en-GB" sz="1400" dirty="0"/>
                     </a:p>
                   </a:txBody>
@@ -4953,6 +5025,10 @@
                     <a:bodyPr/>
                     <a:lstStyle/>
                     <a:p>
+                      <a:r>
+                        <a:rPr lang="en-US" sz="1400" dirty="0"/>
+                        <a:t>Int</a:t>
+                      </a:r>
                       <a:endParaRPr lang="en-GB" sz="1400" dirty="0"/>
                     </a:p>
                   </a:txBody>

</xml_diff>

<commit_message>
made presentation and small edits to app, mainly for screenshots
</commit_message>
<xml_diff>
--- a/ERDIMS.pptx
+++ b/ERDIMS.pptx
@@ -262,7 +262,7 @@
           <a:p>
             <a:fld id="{5051FD8D-56BE-41D6-A4FE-62A6C410B842}" type="datetimeFigureOut">
               <a:rPr lang="en-GB" smtClean="0"/>
-              <a:t>04/07/2020</a:t>
+              <a:t>16/07/2020</a:t>
             </a:fld>
             <a:endParaRPr lang="en-GB"/>
           </a:p>
@@ -462,7 +462,7 @@
           <a:p>
             <a:fld id="{5051FD8D-56BE-41D6-A4FE-62A6C410B842}" type="datetimeFigureOut">
               <a:rPr lang="en-GB" smtClean="0"/>
-              <a:t>04/07/2020</a:t>
+              <a:t>16/07/2020</a:t>
             </a:fld>
             <a:endParaRPr lang="en-GB"/>
           </a:p>
@@ -672,7 +672,7 @@
           <a:p>
             <a:fld id="{5051FD8D-56BE-41D6-A4FE-62A6C410B842}" type="datetimeFigureOut">
               <a:rPr lang="en-GB" smtClean="0"/>
-              <a:t>04/07/2020</a:t>
+              <a:t>16/07/2020</a:t>
             </a:fld>
             <a:endParaRPr lang="en-GB"/>
           </a:p>
@@ -872,7 +872,7 @@
           <a:p>
             <a:fld id="{5051FD8D-56BE-41D6-A4FE-62A6C410B842}" type="datetimeFigureOut">
               <a:rPr lang="en-GB" smtClean="0"/>
-              <a:t>04/07/2020</a:t>
+              <a:t>16/07/2020</a:t>
             </a:fld>
             <a:endParaRPr lang="en-GB"/>
           </a:p>
@@ -1148,7 +1148,7 @@
           <a:p>
             <a:fld id="{5051FD8D-56BE-41D6-A4FE-62A6C410B842}" type="datetimeFigureOut">
               <a:rPr lang="en-GB" smtClean="0"/>
-              <a:t>04/07/2020</a:t>
+              <a:t>16/07/2020</a:t>
             </a:fld>
             <a:endParaRPr lang="en-GB"/>
           </a:p>
@@ -1416,7 +1416,7 @@
           <a:p>
             <a:fld id="{5051FD8D-56BE-41D6-A4FE-62A6C410B842}" type="datetimeFigureOut">
               <a:rPr lang="en-GB" smtClean="0"/>
-              <a:t>04/07/2020</a:t>
+              <a:t>16/07/2020</a:t>
             </a:fld>
             <a:endParaRPr lang="en-GB"/>
           </a:p>
@@ -1831,7 +1831,7 @@
           <a:p>
             <a:fld id="{5051FD8D-56BE-41D6-A4FE-62A6C410B842}" type="datetimeFigureOut">
               <a:rPr lang="en-GB" smtClean="0"/>
-              <a:t>04/07/2020</a:t>
+              <a:t>16/07/2020</a:t>
             </a:fld>
             <a:endParaRPr lang="en-GB"/>
           </a:p>
@@ -1973,7 +1973,7 @@
           <a:p>
             <a:fld id="{5051FD8D-56BE-41D6-A4FE-62A6C410B842}" type="datetimeFigureOut">
               <a:rPr lang="en-GB" smtClean="0"/>
-              <a:t>04/07/2020</a:t>
+              <a:t>16/07/2020</a:t>
             </a:fld>
             <a:endParaRPr lang="en-GB"/>
           </a:p>
@@ -2086,7 +2086,7 @@
           <a:p>
             <a:fld id="{5051FD8D-56BE-41D6-A4FE-62A6C410B842}" type="datetimeFigureOut">
               <a:rPr lang="en-GB" smtClean="0"/>
-              <a:t>04/07/2020</a:t>
+              <a:t>16/07/2020</a:t>
             </a:fld>
             <a:endParaRPr lang="en-GB"/>
           </a:p>
@@ -2399,7 +2399,7 @@
           <a:p>
             <a:fld id="{5051FD8D-56BE-41D6-A4FE-62A6C410B842}" type="datetimeFigureOut">
               <a:rPr lang="en-GB" smtClean="0"/>
-              <a:t>04/07/2020</a:t>
+              <a:t>16/07/2020</a:t>
             </a:fld>
             <a:endParaRPr lang="en-GB"/>
           </a:p>
@@ -2688,7 +2688,7 @@
           <a:p>
             <a:fld id="{5051FD8D-56BE-41D6-A4FE-62A6C410B842}" type="datetimeFigureOut">
               <a:rPr lang="en-GB" smtClean="0"/>
-              <a:t>04/07/2020</a:t>
+              <a:t>16/07/2020</a:t>
             </a:fld>
             <a:endParaRPr lang="en-GB"/>
           </a:p>
@@ -2931,7 +2931,7 @@
           <a:p>
             <a:fld id="{5051FD8D-56BE-41D6-A4FE-62A6C410B842}" type="datetimeFigureOut">
               <a:rPr lang="en-GB" smtClean="0"/>
-              <a:t>04/07/2020</a:t>
+              <a:t>16/07/2020</a:t>
             </a:fld>
             <a:endParaRPr lang="en-GB"/>
           </a:p>
@@ -4540,14 +4540,14 @@
           <p:nvPr>
             <p:extLst>
               <p:ext uri="{D42A27DB-BD31-4B8C-83A1-F6EECF244321}">
-                <p14:modId xmlns:p14="http://schemas.microsoft.com/office/powerpoint/2010/main" val="2515779031"/>
+                <p14:modId xmlns:p14="http://schemas.microsoft.com/office/powerpoint/2010/main" val="2309789852"/>
               </p:ext>
             </p:extLst>
           </p:nvPr>
         </p:nvGraphicFramePr>
         <p:xfrm>
           <a:off x="7305337" y="3808508"/>
-          <a:ext cx="3836140" cy="1606684"/>
+          <a:ext cx="3836140" cy="1932155"/>
         </p:xfrm>
         <a:graphic>
           <a:graphicData uri="http://schemas.openxmlformats.org/drawingml/2006/table">
@@ -4700,6 +4700,41 @@
                     <a:lstStyle/>
                     <a:p>
                       <a:r>
+                        <a:rPr lang="en-US" sz="1400" dirty="0"/>
+                        <a:t>Item name</a:t>
+                      </a:r>
+                      <a:endParaRPr lang="en-GB" sz="1400" dirty="0"/>
+                    </a:p>
+                  </a:txBody>
+                  <a:tcPr/>
+                </a:tc>
+                <a:tc>
+                  <a:txBody>
+                    <a:bodyPr/>
+                    <a:lstStyle/>
+                    <a:p>
+                      <a:r>
+                        <a:rPr lang="en-US" sz="1400" dirty="0"/>
+                        <a:t>Varchar(60)</a:t>
+                      </a:r>
+                      <a:endParaRPr lang="en-GB" sz="1400" dirty="0"/>
+                    </a:p>
+                  </a:txBody>
+                  <a:tcPr/>
+                </a:tc>
+                <a:extLst>
+                  <a:ext uri="{0D108BD9-81ED-4DB2-BD59-A6C34878D82A}">
+                    <a16:rowId xmlns:a16="http://schemas.microsoft.com/office/drawing/2014/main" val="2904563456"/>
+                  </a:ext>
+                </a:extLst>
+              </a:tr>
+              <a:tr h="325471">
+                <a:tc>
+                  <a:txBody>
+                    <a:bodyPr/>
+                    <a:lstStyle/>
+                    <a:p>
+                      <a:r>
                         <a:rPr lang="en-US" sz="1400" dirty="0" err="1"/>
                         <a:t>Quantity_in_stock</a:t>
                       </a:r>
@@ -4724,7 +4759,7 @@
                 </a:tc>
                 <a:extLst>
                   <a:ext uri="{0D108BD9-81ED-4DB2-BD59-A6C34878D82A}">
-                    <a16:rowId xmlns:a16="http://schemas.microsoft.com/office/drawing/2014/main" val="2904563456"/>
+                    <a16:rowId xmlns:a16="http://schemas.microsoft.com/office/drawing/2014/main" val="1876743527"/>
                   </a:ext>
                 </a:extLst>
               </a:tr>

</xml_diff>